<commit_message>
graph corrected and feedback updated
</commit_message>
<xml_diff>
--- a/static/images/image_development/Feedback slides.pptx
+++ b/static/images/image_development/Feedback slides.pptx
@@ -245,7 +245,7 @@
           <a:p>
             <a:fld id="{C764DE79-268F-4C1A-8933-263129D2AF90}" type="datetimeFigureOut">
               <a:rPr lang="en-US" dirty="0"/>
-              <a:t>12/17/2019</a:t>
+              <a:t>12/23/2019</a:t>
             </a:fld>
             <a:endParaRPr lang="en-US" dirty="0"/>
           </a:p>
@@ -415,7 +415,7 @@
           <a:p>
             <a:fld id="{C764DE79-268F-4C1A-8933-263129D2AF90}" type="datetimeFigureOut">
               <a:rPr lang="en-US" dirty="0"/>
-              <a:t>12/17/2019</a:t>
+              <a:t>12/23/2019</a:t>
             </a:fld>
             <a:endParaRPr lang="en-US" dirty="0"/>
           </a:p>
@@ -595,7 +595,7 @@
           <a:p>
             <a:fld id="{C764DE79-268F-4C1A-8933-263129D2AF90}" type="datetimeFigureOut">
               <a:rPr lang="en-US" dirty="0"/>
-              <a:t>12/17/2019</a:t>
+              <a:t>12/23/2019</a:t>
             </a:fld>
             <a:endParaRPr lang="en-US" dirty="0"/>
           </a:p>
@@ -795,7 +795,7 @@
           <a:p>
             <a:fld id="{C764DE79-268F-4C1A-8933-263129D2AF90}" type="datetimeFigureOut">
               <a:rPr lang="en-US" dirty="0"/>
-              <a:t>12/17/2019</a:t>
+              <a:t>12/23/2019</a:t>
             </a:fld>
             <a:endParaRPr lang="en-US" dirty="0"/>
           </a:p>
@@ -1041,7 +1041,7 @@
           <a:p>
             <a:fld id="{C764DE79-268F-4C1A-8933-263129D2AF90}" type="datetimeFigureOut">
               <a:rPr lang="en-US" dirty="0"/>
-              <a:t>12/17/2019</a:t>
+              <a:t>12/23/2019</a:t>
             </a:fld>
             <a:endParaRPr lang="en-US" dirty="0"/>
           </a:p>
@@ -1273,7 +1273,7 @@
           <a:p>
             <a:fld id="{C764DE79-268F-4C1A-8933-263129D2AF90}" type="datetimeFigureOut">
               <a:rPr lang="en-US" dirty="0"/>
-              <a:t>12/17/2019</a:t>
+              <a:t>12/23/2019</a:t>
             </a:fld>
             <a:endParaRPr lang="en-US" dirty="0"/>
           </a:p>
@@ -1640,7 +1640,7 @@
           <a:p>
             <a:fld id="{C764DE79-268F-4C1A-8933-263129D2AF90}" type="datetimeFigureOut">
               <a:rPr lang="en-US" dirty="0"/>
-              <a:t>12/17/2019</a:t>
+              <a:t>12/23/2019</a:t>
             </a:fld>
             <a:endParaRPr lang="en-US" dirty="0"/>
           </a:p>
@@ -1758,7 +1758,7 @@
           <a:p>
             <a:fld id="{C764DE79-268F-4C1A-8933-263129D2AF90}" type="datetimeFigureOut">
               <a:rPr lang="en-US" dirty="0"/>
-              <a:t>12/17/2019</a:t>
+              <a:t>12/23/2019</a:t>
             </a:fld>
             <a:endParaRPr lang="en-US" dirty="0"/>
           </a:p>
@@ -1853,7 +1853,7 @@
           <a:p>
             <a:fld id="{C764DE79-268F-4C1A-8933-263129D2AF90}" type="datetimeFigureOut">
               <a:rPr lang="en-US" dirty="0"/>
-              <a:t>12/17/2019</a:t>
+              <a:t>12/23/2019</a:t>
             </a:fld>
             <a:endParaRPr lang="en-US" dirty="0"/>
           </a:p>
@@ -2130,7 +2130,7 @@
           <a:p>
             <a:fld id="{C764DE79-268F-4C1A-8933-263129D2AF90}" type="datetimeFigureOut">
               <a:rPr lang="en-US" dirty="0"/>
-              <a:t>12/17/2019</a:t>
+              <a:t>12/23/2019</a:t>
             </a:fld>
             <a:endParaRPr lang="en-US" dirty="0"/>
           </a:p>
@@ -2387,7 +2387,7 @@
           <a:p>
             <a:fld id="{C764DE79-268F-4C1A-8933-263129D2AF90}" type="datetimeFigureOut">
               <a:rPr lang="en-US" dirty="0"/>
-              <a:t>12/17/2019</a:t>
+              <a:t>12/23/2019</a:t>
             </a:fld>
             <a:endParaRPr lang="en-US" dirty="0"/>
           </a:p>
@@ -2603,7 +2603,7 @@
           <a:p>
             <a:fld id="{C764DE79-268F-4C1A-8933-263129D2AF90}" type="datetimeFigureOut">
               <a:rPr lang="en-US" dirty="0"/>
-              <a:t>12/17/2019</a:t>
+              <a:t>12/23/2019</a:t>
             </a:fld>
             <a:endParaRPr lang="en-US" dirty="0"/>
           </a:p>
@@ -3128,10 +3128,10 @@
       </p:pic>
       <p:sp>
         <p:nvSpPr>
-          <p:cNvPr id="39" name="TextBox 38">
+          <p:cNvPr id="50" name="TextBox 49">
             <a:extLst>
               <a:ext uri="{FF2B5EF4-FFF2-40B4-BE49-F238E27FC236}">
-                <a16:creationId xmlns:a16="http://schemas.microsoft.com/office/drawing/2014/main" id="{06FB5736-7DB6-4556-BA2F-AF49B27A98C3}"/>
+                <a16:creationId xmlns:a16="http://schemas.microsoft.com/office/drawing/2014/main" id="{DE61F6FC-9A0A-44D0-922F-C407C01776B1}"/>
               </a:ext>
             </a:extLst>
           </p:cNvPr>
@@ -3140,8 +3140,8 @@
         </p:nvSpPr>
         <p:spPr>
           <a:xfrm>
-            <a:off x="6950729" y="4154356"/>
-            <a:ext cx="3233276" cy="2092881"/>
+            <a:off x="6972250" y="2842751"/>
+            <a:ext cx="7035182" cy="369332"/>
           </a:xfrm>
           <a:prstGeom prst="rect">
             <a:avLst/>
@@ -3156,33 +3156,25 @@
           <a:p>
             <a:pPr algn="ctr"/>
             <a:r>
-              <a:rPr lang="en-GB" sz="6600" dirty="0">
+              <a:rPr lang="en-GB" dirty="0">
                 <a:solidFill>
-                  <a:srgbClr val="01A850"/>
+                  <a:schemeClr val="accent5">
+                    <a:lumMod val="40000"/>
+                    <a:lumOff val="60000"/>
+                  </a:schemeClr>
                 </a:solidFill>
               </a:rPr>
-              <a:t>35% </a:t>
-            </a:r>
-          </a:p>
-          <a:p>
-            <a:pPr algn="ctr"/>
-            <a:r>
-              <a:rPr lang="en-GB" sz="3200" dirty="0">
-                <a:solidFill>
-                  <a:srgbClr val="01A850"/>
-                </a:solidFill>
-              </a:rPr>
-              <a:t>% OF TOWERS NEAR CANAL</a:t>
-            </a:r>
-          </a:p>
-        </p:txBody>
-      </p:sp>
-      <p:sp>
-        <p:nvSpPr>
-          <p:cNvPr id="49" name="Rectangle: Rounded Corners 48">
+              <a:t>[CLICK   ON  THE IMAGE   FOR    INFORMATION]</a:t>
+            </a:r>
+          </a:p>
+        </p:txBody>
+      </p:sp>
+      <p:sp>
+        <p:nvSpPr>
+          <p:cNvPr id="62" name="Rectangle: Rounded Corners 61">
             <a:extLst>
               <a:ext uri="{FF2B5EF4-FFF2-40B4-BE49-F238E27FC236}">
-                <a16:creationId xmlns:a16="http://schemas.microsoft.com/office/drawing/2014/main" id="{11E2E927-211C-442F-A4A8-CF01967F890E}"/>
+                <a16:creationId xmlns:a16="http://schemas.microsoft.com/office/drawing/2014/main" id="{33C380F9-DA99-49DC-AD34-87CB31AACD44}"/>
               </a:ext>
             </a:extLst>
           </p:cNvPr>
@@ -3191,8 +3183,8 @@
         </p:nvSpPr>
         <p:spPr>
           <a:xfrm>
-            <a:off x="6972251" y="3885717"/>
-            <a:ext cx="3233276" cy="2496158"/>
+            <a:off x="7534551" y="770611"/>
+            <a:ext cx="5910580" cy="2496158"/>
           </a:xfrm>
           <a:prstGeom prst="roundRect">
             <a:avLst/>
@@ -3235,10 +3227,10 @@
       </p:sp>
       <p:sp>
         <p:nvSpPr>
-          <p:cNvPr id="50" name="TextBox 49">
+          <p:cNvPr id="11" name="TextBox 10">
             <a:extLst>
               <a:ext uri="{FF2B5EF4-FFF2-40B4-BE49-F238E27FC236}">
-                <a16:creationId xmlns:a16="http://schemas.microsoft.com/office/drawing/2014/main" id="{DE61F6FC-9A0A-44D0-922F-C407C01776B1}"/>
+                <a16:creationId xmlns:a16="http://schemas.microsoft.com/office/drawing/2014/main" id="{F898F63A-DD64-4C1A-97EC-4C5AE8A9F4D4}"/>
               </a:ext>
             </a:extLst>
           </p:cNvPr>
@@ -3247,8 +3239,8 @@
         </p:nvSpPr>
         <p:spPr>
           <a:xfrm>
-            <a:off x="6972250" y="2842751"/>
-            <a:ext cx="7035182" cy="369332"/>
+            <a:off x="7556073" y="4154356"/>
+            <a:ext cx="5912341" cy="2092881"/>
           </a:xfrm>
           <a:prstGeom prst="rect">
             <a:avLst/>
@@ -3263,25 +3255,33 @@
           <a:p>
             <a:pPr algn="ctr"/>
             <a:r>
-              <a:rPr lang="en-GB" dirty="0">
+              <a:rPr lang="en-GB" sz="6600" dirty="0">
                 <a:solidFill>
-                  <a:schemeClr val="accent5">
-                    <a:lumMod val="40000"/>
-                    <a:lumOff val="60000"/>
-                  </a:schemeClr>
+                  <a:srgbClr val="E600AA"/>
                 </a:solidFill>
               </a:rPr>
-              <a:t>[CLICK   ON  THE IMAGE   FOR    INFORMATION]</a:t>
-            </a:r>
-          </a:p>
-        </p:txBody>
-      </p:sp>
-      <p:sp>
-        <p:nvSpPr>
-          <p:cNvPr id="62" name="Rectangle: Rounded Corners 61">
+              <a:t> </a:t>
+            </a:r>
+          </a:p>
+          <a:p>
+            <a:pPr algn="ctr"/>
+            <a:r>
+              <a:rPr lang="en-GB" sz="3200" dirty="0">
+                <a:solidFill>
+                  <a:srgbClr val="01A850"/>
+                </a:solidFill>
+              </a:rPr>
+              <a:t>PROPORTION OF TOWERS LOCATED NEAR CANAL</a:t>
+            </a:r>
+          </a:p>
+        </p:txBody>
+      </p:sp>
+      <p:sp>
+        <p:nvSpPr>
+          <p:cNvPr id="12" name="Rectangle: Rounded Corners 11">
             <a:extLst>
               <a:ext uri="{FF2B5EF4-FFF2-40B4-BE49-F238E27FC236}">
-                <a16:creationId xmlns:a16="http://schemas.microsoft.com/office/drawing/2014/main" id="{33C380F9-DA99-49DC-AD34-87CB31AACD44}"/>
+                <a16:creationId xmlns:a16="http://schemas.microsoft.com/office/drawing/2014/main" id="{EF11AE72-5520-4C5E-BCF0-3D280E0FA775}"/>
               </a:ext>
             </a:extLst>
           </p:cNvPr>
@@ -3290,8 +3290,8 @@
         </p:nvSpPr>
         <p:spPr>
           <a:xfrm>
-            <a:off x="6972250" y="770611"/>
-            <a:ext cx="7035182" cy="2496158"/>
+            <a:off x="7577595" y="3885717"/>
+            <a:ext cx="5890819" cy="2496158"/>
           </a:xfrm>
           <a:prstGeom prst="roundRect">
             <a:avLst/>
@@ -3329,113 +3329,6 @@
                 <a:srgbClr val="E600AA"/>
               </a:solidFill>
             </a:endParaRPr>
-          </a:p>
-        </p:txBody>
-      </p:sp>
-      <p:sp>
-        <p:nvSpPr>
-          <p:cNvPr id="107" name="Rectangle: Rounded Corners 106">
-            <a:extLst>
-              <a:ext uri="{FF2B5EF4-FFF2-40B4-BE49-F238E27FC236}">
-                <a16:creationId xmlns:a16="http://schemas.microsoft.com/office/drawing/2014/main" id="{0270B002-3CED-405E-B54E-311960DC175D}"/>
-              </a:ext>
-            </a:extLst>
-          </p:cNvPr>
-          <p:cNvSpPr/>
-          <p:nvPr/>
-        </p:nvSpPr>
-        <p:spPr>
-          <a:xfrm>
-            <a:off x="10774156" y="3885717"/>
-            <a:ext cx="3233276" cy="2496158"/>
-          </a:xfrm>
-          <a:prstGeom prst="roundRect">
-            <a:avLst/>
-          </a:prstGeom>
-          <a:noFill/>
-          <a:ln w="19050">
-            <a:solidFill>
-              <a:srgbClr val="01A850"/>
-            </a:solidFill>
-          </a:ln>
-        </p:spPr>
-        <p:style>
-          <a:lnRef idx="2">
-            <a:schemeClr val="accent1">
-              <a:shade val="50000"/>
-            </a:schemeClr>
-          </a:lnRef>
-          <a:fillRef idx="1">
-            <a:schemeClr val="accent1"/>
-          </a:fillRef>
-          <a:effectRef idx="0">
-            <a:schemeClr val="accent1"/>
-          </a:effectRef>
-          <a:fontRef idx="minor">
-            <a:schemeClr val="lt1"/>
-          </a:fontRef>
-        </p:style>
-        <p:txBody>
-          <a:bodyPr rtlCol="0" anchor="ctr"/>
-          <a:lstStyle/>
-          <a:p>
-            <a:pPr algn="ctr"/>
-            <a:endParaRPr lang="en-GB">
-              <a:solidFill>
-                <a:srgbClr val="E600AA"/>
-              </a:solidFill>
-            </a:endParaRPr>
-          </a:p>
-        </p:txBody>
-      </p:sp>
-      <p:sp>
-        <p:nvSpPr>
-          <p:cNvPr id="108" name="TextBox 107">
-            <a:extLst>
-              <a:ext uri="{FF2B5EF4-FFF2-40B4-BE49-F238E27FC236}">
-                <a16:creationId xmlns:a16="http://schemas.microsoft.com/office/drawing/2014/main" id="{31B4E28A-688C-4F82-A2ED-77D20C5BA77E}"/>
-              </a:ext>
-            </a:extLst>
-          </p:cNvPr>
-          <p:cNvSpPr txBox="1"/>
-          <p:nvPr/>
-        </p:nvSpPr>
-        <p:spPr>
-          <a:xfrm>
-            <a:off x="10774156" y="4154356"/>
-            <a:ext cx="3233276" cy="1969770"/>
-          </a:xfrm>
-          <a:prstGeom prst="rect">
-            <a:avLst/>
-          </a:prstGeom>
-          <a:noFill/>
-        </p:spPr>
-        <p:txBody>
-          <a:bodyPr wrap="square" rtlCol="0">
-            <a:spAutoFit/>
-          </a:bodyPr>
-          <a:lstStyle/>
-          <a:p>
-            <a:pPr algn="ctr"/>
-            <a:r>
-              <a:rPr lang="en-GB" sz="6600" dirty="0">
-                <a:solidFill>
-                  <a:srgbClr val="01A850"/>
-                </a:solidFill>
-              </a:rPr>
-              <a:t>35% </a:t>
-            </a:r>
-          </a:p>
-          <a:p>
-            <a:pPr algn="ctr"/>
-            <a:r>
-              <a:rPr lang="en-GB" sz="2800" dirty="0">
-                <a:solidFill>
-                  <a:srgbClr val="01A850"/>
-                </a:solidFill>
-              </a:rPr>
-              <a:t>% OF PUBLIC AREA NEAR CANAL</a:t>
-            </a:r>
           </a:p>
         </p:txBody>
       </p:sp>
@@ -3504,7 +3397,7 @@
                   <a:srgbClr val="E600AA"/>
                 </a:solidFill>
               </a:rPr>
-              <a:t>35% </a:t>
+              <a:t> </a:t>
             </a:r>
           </a:p>
           <a:p>
@@ -3515,7 +3408,7 @@
                   <a:srgbClr val="E600AA"/>
                 </a:solidFill>
               </a:rPr>
-              <a:t>YOUR RESIDENTIAL IS LOCATED NEAR RAILWAY</a:t>
+              <a:t>PROPORTION OF TOWERS LOCATED NEAR RAILWAY</a:t>
             </a:r>
           </a:p>
         </p:txBody>
@@ -3959,7 +3852,7 @@
                   <a:srgbClr val="E600AA"/>
                 </a:solidFill>
               </a:rPr>
-              <a:t>35% </a:t>
+              <a:t> </a:t>
             </a:r>
           </a:p>
           <a:p>
@@ -3970,7 +3863,7 @@
                   <a:srgbClr val="E600AA"/>
                 </a:solidFill>
               </a:rPr>
-              <a:t>YOUR RESIDENTIAL IS LOCATED NEAR RAILWAY</a:t>
+              <a:t>NUMBER OF UNDERPASSES CONSIDERED IN YOUR NETWORK</a:t>
             </a:r>
           </a:p>
         </p:txBody>

</xml_diff>